<commit_message>
Finished the prelim slides
</commit_message>
<xml_diff>
--- a/Diagrams.pptx
+++ b/Diagrams.pptx
@@ -6,6 +6,7 @@
   </p:sldMasterIdLst>
   <p:sldIdLst>
     <p:sldId id="256" r:id="rId2"/>
+    <p:sldId id="257" r:id="rId3"/>
   </p:sldIdLst>
   <p:sldSz cx="12192000" cy="6858000"/>
   <p:notesSz cx="6858000" cy="9144000"/>
@@ -3371,6 +3372,11 @@
           <a:prstGeom prst="roundRect">
             <a:avLst/>
           </a:prstGeom>
+          <a:ln>
+            <a:solidFill>
+              <a:schemeClr val="tx1"/>
+            </a:solidFill>
+          </a:ln>
         </p:spPr>
         <p:style>
           <a:lnRef idx="2">
@@ -3503,6 +3509,11 @@
           <a:prstGeom prst="roundRect">
             <a:avLst/>
           </a:prstGeom>
+          <a:ln>
+            <a:solidFill>
+              <a:schemeClr val="tx1"/>
+            </a:solidFill>
+          </a:ln>
         </p:spPr>
         <p:style>
           <a:lnRef idx="2">
@@ -3558,6 +3569,11 @@
           <a:prstGeom prst="roundRect">
             <a:avLst/>
           </a:prstGeom>
+          <a:ln>
+            <a:solidFill>
+              <a:schemeClr val="tx1"/>
+            </a:solidFill>
+          </a:ln>
         </p:spPr>
         <p:style>
           <a:lnRef idx="2">
@@ -3613,6 +3629,11 @@
           <a:prstGeom prst="roundRect">
             <a:avLst/>
           </a:prstGeom>
+          <a:ln>
+            <a:solidFill>
+              <a:schemeClr val="tx1"/>
+            </a:solidFill>
+          </a:ln>
         </p:spPr>
         <p:style>
           <a:lnRef idx="2">
@@ -3765,50 +3786,6 @@
           </a:fontRef>
         </p:style>
       </p:cxnSp>
-      <p:cxnSp>
-        <p:nvCxnSpPr>
-          <p:cNvPr id="49" name="Straight Arrow Connector 48">
-            <a:extLst>
-              <a:ext uri="{FF2B5EF4-FFF2-40B4-BE49-F238E27FC236}">
-                <a16:creationId xmlns:a16="http://schemas.microsoft.com/office/drawing/2014/main" id="{C98E9741-7FB9-8AA3-16B8-6116114ED564}"/>
-              </a:ext>
-            </a:extLst>
-          </p:cNvPr>
-          <p:cNvCxnSpPr>
-            <a:cxnSpLocks/>
-          </p:cNvCxnSpPr>
-          <p:nvPr/>
-        </p:nvCxnSpPr>
-        <p:spPr>
-          <a:xfrm flipH="1">
-            <a:off x="3750132" y="1470451"/>
-            <a:ext cx="5257944" cy="0"/>
-          </a:xfrm>
-          <a:prstGeom prst="straightConnector1">
-            <a:avLst/>
-          </a:prstGeom>
-          <a:ln w="34925" cap="sq">
-            <a:solidFill>
-              <a:schemeClr val="tx1"/>
-            </a:solidFill>
-            <a:tailEnd type="stealth" w="lg" len="lg"/>
-          </a:ln>
-        </p:spPr>
-        <p:style>
-          <a:lnRef idx="1">
-            <a:schemeClr val="accent1"/>
-          </a:lnRef>
-          <a:fillRef idx="0">
-            <a:schemeClr val="accent1"/>
-          </a:fillRef>
-          <a:effectRef idx="0">
-            <a:schemeClr val="accent1"/>
-          </a:effectRef>
-          <a:fontRef idx="minor">
-            <a:schemeClr val="tx1"/>
-          </a:fontRef>
-        </p:style>
-      </p:cxnSp>
       <p:sp>
         <p:nvSpPr>
           <p:cNvPr id="51" name="Rectangle 50">
@@ -3823,8 +3800,8 @@
         </p:nvSpPr>
         <p:spPr>
           <a:xfrm>
-            <a:off x="5041553" y="1103870"/>
-            <a:ext cx="2174789" cy="341863"/>
+            <a:off x="4609064" y="1103870"/>
+            <a:ext cx="1915303" cy="341863"/>
           </a:xfrm>
           <a:prstGeom prst="rect">
             <a:avLst/>
@@ -3860,7 +3837,7 @@
           <a:p>
             <a:pPr algn="ctr"/>
             <a:r>
-              <a:rPr lang="en-US" sz="1600" dirty="0"/>
+              <a:rPr lang="en-US" sz="1400" dirty="0"/>
               <a:t>Evaluate Performance</a:t>
             </a:r>
           </a:p>
@@ -3880,8 +3857,8 @@
         </p:nvSpPr>
         <p:spPr>
           <a:xfrm>
-            <a:off x="5004482" y="1492083"/>
-            <a:ext cx="3669957" cy="341863"/>
+            <a:off x="4584350" y="1516797"/>
+            <a:ext cx="3200407" cy="341863"/>
           </a:xfrm>
           <a:prstGeom prst="rect">
             <a:avLst/>
@@ -3917,8 +3894,65 @@
           <a:p>
             <a:pPr algn="ctr"/>
             <a:r>
-              <a:rPr lang="en-US" sz="1600" dirty="0"/>
+              <a:rPr lang="en-US" sz="1400" dirty="0"/>
               <a:t>Keep change if performance is improved</a:t>
+            </a:r>
+          </a:p>
+        </p:txBody>
+      </p:sp>
+      <p:sp>
+        <p:nvSpPr>
+          <p:cNvPr id="53" name="Rectangle 52">
+            <a:extLst>
+              <a:ext uri="{FF2B5EF4-FFF2-40B4-BE49-F238E27FC236}">
+                <a16:creationId xmlns:a16="http://schemas.microsoft.com/office/drawing/2014/main" id="{25C48757-2B34-F1BC-A714-CE004B53AF9E}"/>
+              </a:ext>
+            </a:extLst>
+          </p:cNvPr>
+          <p:cNvSpPr/>
+          <p:nvPr/>
+        </p:nvSpPr>
+        <p:spPr>
+          <a:xfrm>
+            <a:off x="8223888" y="1076593"/>
+            <a:ext cx="2174789" cy="341863"/>
+          </a:xfrm>
+          <a:prstGeom prst="rect">
+            <a:avLst/>
+          </a:prstGeom>
+          <a:solidFill>
+            <a:schemeClr val="lt1">
+              <a:alpha val="75073"/>
+            </a:schemeClr>
+          </a:solidFill>
+          <a:ln>
+            <a:solidFill>
+              <a:schemeClr val="bg1"/>
+            </a:solidFill>
+          </a:ln>
+        </p:spPr>
+        <p:style>
+          <a:lnRef idx="2">
+            <a:schemeClr val="accent6"/>
+          </a:lnRef>
+          <a:fillRef idx="1">
+            <a:schemeClr val="lt1"/>
+          </a:fillRef>
+          <a:effectRef idx="0">
+            <a:schemeClr val="accent6"/>
+          </a:effectRef>
+          <a:fontRef idx="minor">
+            <a:schemeClr val="dk1"/>
+          </a:fontRef>
+        </p:style>
+        <p:txBody>
+          <a:bodyPr rtlCol="0" anchor="ctr"/>
+          <a:lstStyle/>
+          <a:p>
+            <a:pPr algn="ctr"/>
+            <a:r>
+              <a:rPr lang="en-US" sz="1600" b="1" dirty="0"/>
+              <a:t>SLM-first CAAFE Style</a:t>
             </a:r>
           </a:p>
         </p:txBody>
@@ -3927,6 +3961,664 @@
     <p:extLst>
       <p:ext uri="{BB962C8B-B14F-4D97-AF65-F5344CB8AC3E}">
         <p14:creationId xmlns:p14="http://schemas.microsoft.com/office/powerpoint/2010/main" val="1878277157"/>
+      </p:ext>
+    </p:extLst>
+  </p:cSld>
+  <p:clrMapOvr>
+    <a:masterClrMapping/>
+  </p:clrMapOvr>
+</p:sld>
+</file>
+
+<file path=ppt/slides/slide2.xml><?xml version="1.0" encoding="utf-8"?>
+<p:sld xmlns:a="http://schemas.openxmlformats.org/drawingml/2006/main" xmlns:r="http://schemas.openxmlformats.org/officeDocument/2006/relationships" xmlns:p="http://schemas.openxmlformats.org/presentationml/2006/main">
+  <p:cSld>
+    <p:bg>
+      <p:bgPr>
+        <a:solidFill>
+          <a:schemeClr val="lt1"/>
+        </a:solidFill>
+        <a:effectLst/>
+      </p:bgPr>
+    </p:bg>
+    <p:spTree>
+      <p:nvGrpSpPr>
+        <p:cNvPr id="1" name=""/>
+        <p:cNvGrpSpPr/>
+        <p:nvPr/>
+      </p:nvGrpSpPr>
+      <p:grpSpPr>
+        <a:xfrm>
+          <a:off x="0" y="0"/>
+          <a:ext cx="0" cy="0"/>
+          <a:chOff x="0" y="0"/>
+          <a:chExt cx="0" cy="0"/>
+        </a:xfrm>
+      </p:grpSpPr>
+      <p:sp>
+        <p:nvSpPr>
+          <p:cNvPr id="4" name="Rounded Rectangle 3">
+            <a:extLst>
+              <a:ext uri="{FF2B5EF4-FFF2-40B4-BE49-F238E27FC236}">
+                <a16:creationId xmlns:a16="http://schemas.microsoft.com/office/drawing/2014/main" id="{091BAB56-C24E-3753-D8A7-3924976BAE04}"/>
+              </a:ext>
+            </a:extLst>
+          </p:cNvPr>
+          <p:cNvSpPr/>
+          <p:nvPr/>
+        </p:nvSpPr>
+        <p:spPr>
+          <a:xfrm>
+            <a:off x="5157627" y="308226"/>
+            <a:ext cx="1263721" cy="441789"/>
+          </a:xfrm>
+          <a:prstGeom prst="roundRect">
+            <a:avLst/>
+          </a:prstGeom>
+          <a:solidFill>
+            <a:schemeClr val="accent5">
+              <a:lumMod val="20000"/>
+              <a:lumOff val="80000"/>
+            </a:schemeClr>
+          </a:solidFill>
+        </p:spPr>
+        <p:style>
+          <a:lnRef idx="2">
+            <a:schemeClr val="dk1"/>
+          </a:lnRef>
+          <a:fillRef idx="1">
+            <a:schemeClr val="lt1"/>
+          </a:fillRef>
+          <a:effectRef idx="0">
+            <a:schemeClr val="dk1"/>
+          </a:effectRef>
+          <a:fontRef idx="minor">
+            <a:schemeClr val="dk1"/>
+          </a:fontRef>
+        </p:style>
+        <p:txBody>
+          <a:bodyPr rtlCol="0" anchor="ctr"/>
+          <a:lstStyle/>
+          <a:p>
+            <a:pPr algn="ctr"/>
+            <a:r>
+              <a:rPr lang="en-US" b="1" dirty="0"/>
+              <a:t>Dataset</a:t>
+            </a:r>
+          </a:p>
+        </p:txBody>
+      </p:sp>
+      <p:sp>
+        <p:nvSpPr>
+          <p:cNvPr id="7" name="Rounded Rectangle 6">
+            <a:extLst>
+              <a:ext uri="{FF2B5EF4-FFF2-40B4-BE49-F238E27FC236}">
+                <a16:creationId xmlns:a16="http://schemas.microsoft.com/office/drawing/2014/main" id="{338DE683-DC57-8169-37B6-03426AB4F100}"/>
+              </a:ext>
+            </a:extLst>
+          </p:cNvPr>
+          <p:cNvSpPr/>
+          <p:nvPr/>
+        </p:nvSpPr>
+        <p:spPr>
+          <a:xfrm>
+            <a:off x="4171309" y="1089063"/>
+            <a:ext cx="3400746" cy="565075"/>
+          </a:xfrm>
+          <a:prstGeom prst="roundRect">
+            <a:avLst/>
+          </a:prstGeom>
+          <a:solidFill>
+            <a:schemeClr val="accent1"/>
+          </a:solidFill>
+        </p:spPr>
+        <p:style>
+          <a:lnRef idx="2">
+            <a:schemeClr val="dk1"/>
+          </a:lnRef>
+          <a:fillRef idx="1">
+            <a:schemeClr val="lt1"/>
+          </a:fillRef>
+          <a:effectRef idx="0">
+            <a:schemeClr val="dk1"/>
+          </a:effectRef>
+          <a:fontRef idx="minor">
+            <a:schemeClr val="dk1"/>
+          </a:fontRef>
+        </p:style>
+        <p:txBody>
+          <a:bodyPr rtlCol="0" anchor="ctr"/>
+          <a:lstStyle/>
+          <a:p>
+            <a:pPr algn="ctr"/>
+            <a:r>
+              <a:rPr lang="en-US" sz="1600" b="1" dirty="0"/>
+              <a:t>Planner Agent</a:t>
+            </a:r>
+          </a:p>
+          <a:p>
+            <a:pPr algn="ctr"/>
+            <a:r>
+              <a:rPr lang="en-US" sz="1200" dirty="0"/>
+              <a:t>SLM: Task Routing, Dependency Management</a:t>
+            </a:r>
+          </a:p>
+        </p:txBody>
+      </p:sp>
+      <p:sp>
+        <p:nvSpPr>
+          <p:cNvPr id="8" name="Rounded Rectangle 7">
+            <a:extLst>
+              <a:ext uri="{FF2B5EF4-FFF2-40B4-BE49-F238E27FC236}">
+                <a16:creationId xmlns:a16="http://schemas.microsoft.com/office/drawing/2014/main" id="{61C17850-0CF6-9B2D-CDA9-F30018DA1FB3}"/>
+              </a:ext>
+            </a:extLst>
+          </p:cNvPr>
+          <p:cNvSpPr/>
+          <p:nvPr/>
+        </p:nvSpPr>
+        <p:spPr>
+          <a:xfrm>
+            <a:off x="441789" y="2095928"/>
+            <a:ext cx="1808251" cy="1160980"/>
+          </a:xfrm>
+          <a:prstGeom prst="roundRect">
+            <a:avLst/>
+          </a:prstGeom>
+          <a:solidFill>
+            <a:schemeClr val="accent1">
+              <a:lumMod val="60000"/>
+              <a:lumOff val="40000"/>
+            </a:schemeClr>
+          </a:solidFill>
+        </p:spPr>
+        <p:style>
+          <a:lnRef idx="2">
+            <a:schemeClr val="dk1"/>
+          </a:lnRef>
+          <a:fillRef idx="1">
+            <a:schemeClr val="lt1"/>
+          </a:fillRef>
+          <a:effectRef idx="0">
+            <a:schemeClr val="dk1"/>
+          </a:effectRef>
+          <a:fontRef idx="minor">
+            <a:schemeClr val="dk1"/>
+          </a:fontRef>
+        </p:style>
+        <p:txBody>
+          <a:bodyPr rtlCol="0" anchor="ctr"/>
+          <a:lstStyle/>
+          <a:p>
+            <a:pPr algn="ctr"/>
+            <a:r>
+              <a:rPr lang="en-US" b="1" dirty="0"/>
+              <a:t>Data Agent</a:t>
+            </a:r>
+          </a:p>
+          <a:p>
+            <a:pPr algn="ctr"/>
+            <a:endParaRPr lang="en-US" dirty="0"/>
+          </a:p>
+          <a:p>
+            <a:pPr algn="ctr"/>
+            <a:r>
+              <a:rPr lang="en-US" sz="1200" b="1" dirty="0"/>
+              <a:t>SLM</a:t>
+            </a:r>
+            <a:r>
+              <a:rPr lang="en-US" sz="1050" dirty="0"/>
+              <a:t> : Quality-Schema-Cleaning</a:t>
+            </a:r>
+          </a:p>
+        </p:txBody>
+      </p:sp>
+      <p:sp>
+        <p:nvSpPr>
+          <p:cNvPr id="10" name="Rounded Rectangle 9">
+            <a:extLst>
+              <a:ext uri="{FF2B5EF4-FFF2-40B4-BE49-F238E27FC236}">
+                <a16:creationId xmlns:a16="http://schemas.microsoft.com/office/drawing/2014/main" id="{F97C13BC-C676-8340-DEBE-8F0AD7AAF06F}"/>
+              </a:ext>
+            </a:extLst>
+          </p:cNvPr>
+          <p:cNvSpPr/>
+          <p:nvPr/>
+        </p:nvSpPr>
+        <p:spPr>
+          <a:xfrm>
+            <a:off x="2936696" y="2095928"/>
+            <a:ext cx="1892157" cy="1160980"/>
+          </a:xfrm>
+          <a:prstGeom prst="roundRect">
+            <a:avLst/>
+          </a:prstGeom>
+          <a:solidFill>
+            <a:schemeClr val="accent1">
+              <a:lumMod val="60000"/>
+              <a:lumOff val="40000"/>
+            </a:schemeClr>
+          </a:solidFill>
+          <a:ln>
+            <a:solidFill>
+              <a:schemeClr val="tx1"/>
+            </a:solidFill>
+          </a:ln>
+        </p:spPr>
+        <p:style>
+          <a:lnRef idx="2">
+            <a:schemeClr val="dk1"/>
+          </a:lnRef>
+          <a:fillRef idx="1">
+            <a:schemeClr val="lt1"/>
+          </a:fillRef>
+          <a:effectRef idx="0">
+            <a:schemeClr val="dk1"/>
+          </a:effectRef>
+          <a:fontRef idx="minor">
+            <a:schemeClr val="dk1"/>
+          </a:fontRef>
+        </p:style>
+        <p:txBody>
+          <a:bodyPr rtlCol="0" anchor="ctr"/>
+          <a:lstStyle/>
+          <a:p>
+            <a:pPr algn="ctr"/>
+            <a:r>
+              <a:rPr lang="en-US" sz="1600" b="1" dirty="0"/>
+              <a:t>Feature Agent</a:t>
+            </a:r>
+          </a:p>
+          <a:p>
+            <a:pPr algn="ctr"/>
+            <a:endParaRPr lang="en-US" sz="1600" dirty="0"/>
+          </a:p>
+          <a:p>
+            <a:pPr algn="ctr"/>
+            <a:r>
+              <a:rPr lang="en-US" sz="1200" b="1" dirty="0"/>
+              <a:t>SLM</a:t>
+            </a:r>
+            <a:r>
+              <a:rPr lang="en-US" sz="1100" dirty="0"/>
+              <a:t> : Engineering-Transformation</a:t>
+            </a:r>
+            <a:endParaRPr lang="en-US" sz="1800" dirty="0"/>
+          </a:p>
+          <a:p>
+            <a:pPr algn="ctr"/>
+            <a:endParaRPr lang="en-US" dirty="0"/>
+          </a:p>
+        </p:txBody>
+      </p:sp>
+      <p:sp>
+        <p:nvSpPr>
+          <p:cNvPr id="11" name="Rounded Rectangle 10">
+            <a:extLst>
+              <a:ext uri="{FF2B5EF4-FFF2-40B4-BE49-F238E27FC236}">
+                <a16:creationId xmlns:a16="http://schemas.microsoft.com/office/drawing/2014/main" id="{0C8AD60F-2C48-0C8C-863A-4BBEBBC13849}"/>
+              </a:ext>
+            </a:extLst>
+          </p:cNvPr>
+          <p:cNvSpPr/>
+          <p:nvPr/>
+        </p:nvSpPr>
+        <p:spPr>
+          <a:xfrm>
+            <a:off x="6897386" y="2095928"/>
+            <a:ext cx="1979486" cy="1160980"/>
+          </a:xfrm>
+          <a:prstGeom prst="roundRect">
+            <a:avLst/>
+          </a:prstGeom>
+          <a:solidFill>
+            <a:schemeClr val="accent1">
+              <a:lumMod val="60000"/>
+              <a:lumOff val="40000"/>
+            </a:schemeClr>
+          </a:solidFill>
+        </p:spPr>
+        <p:style>
+          <a:lnRef idx="2">
+            <a:schemeClr val="dk1"/>
+          </a:lnRef>
+          <a:fillRef idx="1">
+            <a:schemeClr val="lt1"/>
+          </a:fillRef>
+          <a:effectRef idx="0">
+            <a:schemeClr val="dk1"/>
+          </a:effectRef>
+          <a:fontRef idx="minor">
+            <a:schemeClr val="dk1"/>
+          </a:fontRef>
+        </p:style>
+        <p:txBody>
+          <a:bodyPr rtlCol="0" anchor="ctr"/>
+          <a:lstStyle/>
+          <a:p>
+            <a:pPr algn="ctr"/>
+            <a:r>
+              <a:rPr lang="en-US" sz="1600" b="1" dirty="0"/>
+              <a:t>Model Agent</a:t>
+            </a:r>
+          </a:p>
+          <a:p>
+            <a:pPr algn="ctr"/>
+            <a:endParaRPr lang="en-US" sz="1600" dirty="0"/>
+          </a:p>
+          <a:p>
+            <a:pPr algn="ctr"/>
+            <a:r>
+              <a:rPr lang="en-US" sz="1200" b="1" dirty="0"/>
+              <a:t>SLM</a:t>
+            </a:r>
+            <a:r>
+              <a:rPr lang="en-US" sz="1600" dirty="0"/>
+              <a:t> : </a:t>
+            </a:r>
+            <a:r>
+              <a:rPr lang="en-US" sz="1200" dirty="0"/>
+              <a:t>Architecture-Selection</a:t>
+            </a:r>
+          </a:p>
+          <a:p>
+            <a:pPr algn="ctr"/>
+            <a:endParaRPr lang="en-US" sz="1600" dirty="0"/>
+          </a:p>
+        </p:txBody>
+      </p:sp>
+      <p:sp>
+        <p:nvSpPr>
+          <p:cNvPr id="12" name="Rounded Rectangle 11">
+            <a:extLst>
+              <a:ext uri="{FF2B5EF4-FFF2-40B4-BE49-F238E27FC236}">
+                <a16:creationId xmlns:a16="http://schemas.microsoft.com/office/drawing/2014/main" id="{76743C7C-B976-D7A2-DC52-77337785D9BC}"/>
+              </a:ext>
+            </a:extLst>
+          </p:cNvPr>
+          <p:cNvSpPr/>
+          <p:nvPr/>
+        </p:nvSpPr>
+        <p:spPr>
+          <a:xfrm>
+            <a:off x="9534419" y="2095928"/>
+            <a:ext cx="1979486" cy="1160980"/>
+          </a:xfrm>
+          <a:prstGeom prst="roundRect">
+            <a:avLst/>
+          </a:prstGeom>
+          <a:solidFill>
+            <a:schemeClr val="accent1">
+              <a:lumMod val="60000"/>
+              <a:lumOff val="40000"/>
+            </a:schemeClr>
+          </a:solidFill>
+        </p:spPr>
+        <p:style>
+          <a:lnRef idx="2">
+            <a:schemeClr val="dk1"/>
+          </a:lnRef>
+          <a:fillRef idx="1">
+            <a:schemeClr val="lt1"/>
+          </a:fillRef>
+          <a:effectRef idx="0">
+            <a:schemeClr val="dk1"/>
+          </a:effectRef>
+          <a:fontRef idx="minor">
+            <a:schemeClr val="dk1"/>
+          </a:fontRef>
+        </p:style>
+        <p:txBody>
+          <a:bodyPr rtlCol="0" anchor="ctr"/>
+          <a:lstStyle/>
+          <a:p>
+            <a:pPr algn="ctr"/>
+            <a:r>
+              <a:rPr lang="en-US" sz="1600" b="1" dirty="0"/>
+              <a:t>Hyperparameter Agent</a:t>
+            </a:r>
+            <a:endParaRPr lang="en-US" sz="2400" b="1" dirty="0"/>
+          </a:p>
+          <a:p>
+            <a:pPr algn="ctr"/>
+            <a:r>
+              <a:rPr lang="en-US" sz="1200" b="1" dirty="0"/>
+              <a:t>SLM</a:t>
+            </a:r>
+            <a:r>
+              <a:rPr lang="en-US" sz="1600" dirty="0"/>
+              <a:t> : </a:t>
+            </a:r>
+            <a:r>
+              <a:rPr lang="en-US" sz="1100" dirty="0"/>
+              <a:t>Optimization -Tuning</a:t>
+            </a:r>
+          </a:p>
+          <a:p>
+            <a:pPr algn="ctr"/>
+            <a:endParaRPr lang="en-US" sz="1600" dirty="0"/>
+          </a:p>
+        </p:txBody>
+      </p:sp>
+      <p:sp>
+        <p:nvSpPr>
+          <p:cNvPr id="13" name="Rounded Rectangle 12">
+            <a:extLst>
+              <a:ext uri="{FF2B5EF4-FFF2-40B4-BE49-F238E27FC236}">
+                <a16:creationId xmlns:a16="http://schemas.microsoft.com/office/drawing/2014/main" id="{0E2E0A85-77DA-7216-39C8-3DA40A9133BA}"/>
+              </a:ext>
+            </a:extLst>
+          </p:cNvPr>
+          <p:cNvSpPr/>
+          <p:nvPr/>
+        </p:nvSpPr>
+        <p:spPr>
+          <a:xfrm>
+            <a:off x="4570287" y="3647326"/>
+            <a:ext cx="2388743" cy="1160980"/>
+          </a:xfrm>
+          <a:prstGeom prst="roundRect">
+            <a:avLst/>
+          </a:prstGeom>
+          <a:solidFill>
+            <a:schemeClr val="accent1">
+              <a:lumMod val="60000"/>
+              <a:lumOff val="40000"/>
+            </a:schemeClr>
+          </a:solidFill>
+        </p:spPr>
+        <p:style>
+          <a:lnRef idx="2">
+            <a:schemeClr val="dk1"/>
+          </a:lnRef>
+          <a:fillRef idx="1">
+            <a:schemeClr val="lt1"/>
+          </a:fillRef>
+          <a:effectRef idx="0">
+            <a:schemeClr val="dk1"/>
+          </a:effectRef>
+          <a:fontRef idx="minor">
+            <a:schemeClr val="dk1"/>
+          </a:fontRef>
+        </p:style>
+        <p:txBody>
+          <a:bodyPr rtlCol="0" anchor="ctr"/>
+          <a:lstStyle/>
+          <a:p>
+            <a:pPr algn="ctr"/>
+            <a:r>
+              <a:rPr lang="en-US" sz="1600" b="1" dirty="0"/>
+              <a:t>Evaluator Agent</a:t>
+            </a:r>
+          </a:p>
+          <a:p>
+            <a:pPr algn="ctr"/>
+            <a:endParaRPr lang="en-US" sz="1600" dirty="0"/>
+          </a:p>
+          <a:p>
+            <a:pPr algn="ctr"/>
+            <a:r>
+              <a:rPr lang="en-US" sz="1200" b="1" dirty="0"/>
+              <a:t>SLM</a:t>
+            </a:r>
+            <a:r>
+              <a:rPr lang="en-US" dirty="0"/>
+              <a:t>: </a:t>
+            </a:r>
+            <a:r>
+              <a:rPr lang="en-US" sz="1200" dirty="0"/>
+              <a:t>Metrics—Validation-Reports</a:t>
+            </a:r>
+          </a:p>
+        </p:txBody>
+      </p:sp>
+      <p:sp>
+        <p:nvSpPr>
+          <p:cNvPr id="14" name="Rounded Rectangle 13">
+            <a:extLst>
+              <a:ext uri="{FF2B5EF4-FFF2-40B4-BE49-F238E27FC236}">
+                <a16:creationId xmlns:a16="http://schemas.microsoft.com/office/drawing/2014/main" id="{78C37E6F-6AEE-42D2-51E8-A7F788B30D61}"/>
+              </a:ext>
+            </a:extLst>
+          </p:cNvPr>
+          <p:cNvSpPr/>
+          <p:nvPr/>
+        </p:nvSpPr>
+        <p:spPr>
+          <a:xfrm>
+            <a:off x="2434975" y="5414482"/>
+            <a:ext cx="6041203" cy="626724"/>
+          </a:xfrm>
+          <a:prstGeom prst="roundRect">
+            <a:avLst/>
+          </a:prstGeom>
+          <a:solidFill>
+            <a:srgbClr val="00B050"/>
+          </a:solidFill>
+        </p:spPr>
+        <p:style>
+          <a:lnRef idx="2">
+            <a:schemeClr val="dk1"/>
+          </a:lnRef>
+          <a:fillRef idx="1">
+            <a:schemeClr val="lt1"/>
+          </a:fillRef>
+          <a:effectRef idx="0">
+            <a:schemeClr val="dk1"/>
+          </a:effectRef>
+          <a:fontRef idx="minor">
+            <a:schemeClr val="dk1"/>
+          </a:fontRef>
+        </p:style>
+        <p:txBody>
+          <a:bodyPr rtlCol="0" anchor="ctr"/>
+          <a:lstStyle/>
+          <a:p>
+            <a:pPr algn="ctr"/>
+            <a:r>
+              <a:rPr lang="en-US" b="1" dirty="0"/>
+              <a:t>Sandboxed Execution</a:t>
+            </a:r>
+          </a:p>
+          <a:p>
+            <a:pPr algn="ctr"/>
+            <a:r>
+              <a:rPr lang="en-US" sz="1400" dirty="0"/>
+              <a:t>Structured Communication-Programmatic Validation-Safety Mechanisms</a:t>
+            </a:r>
+          </a:p>
+        </p:txBody>
+      </p:sp>
+      <p:sp>
+        <p:nvSpPr>
+          <p:cNvPr id="15" name="TextBox 14">
+            <a:extLst>
+              <a:ext uri="{FF2B5EF4-FFF2-40B4-BE49-F238E27FC236}">
+                <a16:creationId xmlns:a16="http://schemas.microsoft.com/office/drawing/2014/main" id="{F750E05B-16F0-2C63-8FAA-7325645DD4E1}"/>
+              </a:ext>
+            </a:extLst>
+          </p:cNvPr>
+          <p:cNvSpPr txBox="1"/>
+          <p:nvPr/>
+        </p:nvSpPr>
+        <p:spPr>
+          <a:xfrm>
+            <a:off x="9125162" y="4711712"/>
+            <a:ext cx="2388743" cy="1261884"/>
+          </a:xfrm>
+          <a:prstGeom prst="rect">
+            <a:avLst/>
+          </a:prstGeom>
+          <a:solidFill>
+            <a:schemeClr val="accent4">
+              <a:lumMod val="40000"/>
+              <a:lumOff val="60000"/>
+            </a:schemeClr>
+          </a:solidFill>
+        </p:spPr>
+        <p:txBody>
+          <a:bodyPr wrap="square" rtlCol="0">
+            <a:spAutoFit/>
+          </a:bodyPr>
+          <a:lstStyle/>
+          <a:p>
+            <a:r>
+              <a:rPr lang="en-US" sz="1400" b="1" dirty="0"/>
+              <a:t>Key Features</a:t>
+            </a:r>
+          </a:p>
+          <a:p>
+            <a:r>
+              <a:rPr lang="en-US" sz="1400" dirty="0"/>
+              <a:t>----------------------------------</a:t>
+            </a:r>
+          </a:p>
+          <a:p>
+            <a:pPr marL="285750" indent="-285750">
+              <a:buFont typeface="Wingdings" pitchFamily="2" charset="2"/>
+              <a:buChar char="ü"/>
+            </a:pPr>
+            <a:r>
+              <a:rPr lang="en-US" sz="1200" dirty="0"/>
+              <a:t>Parallel Execution</a:t>
+            </a:r>
+          </a:p>
+          <a:p>
+            <a:pPr marL="285750" indent="-285750">
+              <a:buFont typeface="Wingdings" pitchFamily="2" charset="2"/>
+              <a:buChar char="ü"/>
+            </a:pPr>
+            <a:r>
+              <a:rPr lang="en-US" sz="1200" dirty="0"/>
+              <a:t>Task Dependency Graph</a:t>
+            </a:r>
+          </a:p>
+          <a:p>
+            <a:pPr marL="285750" indent="-285750">
+              <a:buFont typeface="Wingdings" pitchFamily="2" charset="2"/>
+              <a:buChar char="ü"/>
+            </a:pPr>
+            <a:r>
+              <a:rPr lang="en-US" sz="1200" dirty="0"/>
+              <a:t>70-90% Context</a:t>
+            </a:r>
+          </a:p>
+          <a:p>
+            <a:pPr marL="285750" indent="-285750">
+              <a:buFont typeface="Wingdings" pitchFamily="2" charset="2"/>
+              <a:buChar char="ü"/>
+            </a:pPr>
+            <a:r>
+              <a:rPr lang="en-US" sz="1200" dirty="0"/>
+              <a:t>Sub-5min Runtime</a:t>
+            </a:r>
+          </a:p>
+        </p:txBody>
+      </p:sp>
+    </p:spTree>
+    <p:extLst>
+      <p:ext uri="{BB962C8B-B14F-4D97-AF65-F5344CB8AC3E}">
+        <p14:creationId xmlns:p14="http://schemas.microsoft.com/office/powerpoint/2010/main" val="2719792601"/>
       </p:ext>
     </p:extLst>
   </p:cSld>

</xml_diff>